<commit_message>
modify the document for regex
</commit_message>
<xml_diff>
--- a/raspberry-pi-report/すぐに使える正規表現.pptx
+++ b/raspberry-pi-report/すぐに使える正規表現.pptx
@@ -8,8 +8,10 @@
     <p:sldId id="256" r:id="rId2"/>
     <p:sldId id="262" r:id="rId3"/>
     <p:sldId id="263" r:id="rId4"/>
-    <p:sldId id="265" r:id="rId5"/>
-    <p:sldId id="264" r:id="rId6"/>
+    <p:sldId id="267" r:id="rId5"/>
+    <p:sldId id="265" r:id="rId6"/>
+    <p:sldId id="266" r:id="rId7"/>
+    <p:sldId id="268" r:id="rId8"/>
   </p:sldIdLst>
   <p:sldSz cx="12192000" cy="6858000"/>
   <p:notesSz cx="6858000" cy="9144000"/>
@@ -119,7 +121,7 @@
 <file path=ppt/revisionInfo.xml><?xml version="1.0" encoding="utf-8"?>
 <p1510:revInfo xmlns:a="http://schemas.openxmlformats.org/drawingml/2006/main" xmlns:r="http://schemas.openxmlformats.org/officeDocument/2006/relationships" xmlns:p1510="http://schemas.microsoft.com/office/powerpoint/2015/10/main">
   <p1510:revLst>
-    <p1510:client id="{F8197544-B22B-4A13-B6C3-E7FBEF954393}" v="1" dt="2024-10-03T23:41:50.335"/>
+    <p1510:client id="{F8197544-B22B-4A13-B6C3-E7FBEF954393}" v="6" dt="2024-10-04T00:08:27.813"/>
   </p1510:revLst>
 </p1510:revInfo>
 </file>
@@ -181,8 +183,8 @@
   </pc:docChgLst>
   <pc:docChgLst>
     <pc:chgData name="Yoshiharu Hamaguchi" userId="470e288704938fe9" providerId="LiveId" clId="{F8197544-B22B-4A13-B6C3-E7FBEF954393}"/>
-    <pc:docChg chg="custSel delSld modSld">
-      <pc:chgData name="Yoshiharu Hamaguchi" userId="470e288704938fe9" providerId="LiveId" clId="{F8197544-B22B-4A13-B6C3-E7FBEF954393}" dt="2024-10-03T23:44:19.502" v="794" actId="2696"/>
+    <pc:docChg chg="undo custSel addSld delSld modSld">
+      <pc:chgData name="Yoshiharu Hamaguchi" userId="470e288704938fe9" providerId="LiveId" clId="{F8197544-B22B-4A13-B6C3-E7FBEF954393}" dt="2024-10-04T00:09:54.746" v="1546" actId="20577"/>
       <pc:docMkLst>
         <pc:docMk/>
       </pc:docMkLst>
@@ -263,14 +265,21 @@
           </ac:graphicFrameMkLst>
         </pc:graphicFrameChg>
       </pc:sldChg>
+      <pc:sldChg chg="del">
+        <pc:chgData name="Yoshiharu Hamaguchi" userId="470e288704938fe9" providerId="LiveId" clId="{F8197544-B22B-4A13-B6C3-E7FBEF954393}" dt="2024-10-04T00:07:01.468" v="1401" actId="47"/>
+        <pc:sldMkLst>
+          <pc:docMk/>
+          <pc:sldMk cId="3365730422" sldId="264"/>
+        </pc:sldMkLst>
+      </pc:sldChg>
       <pc:sldChg chg="addSp modSp mod">
-        <pc:chgData name="Yoshiharu Hamaguchi" userId="470e288704938fe9" providerId="LiveId" clId="{F8197544-B22B-4A13-B6C3-E7FBEF954393}" dt="2024-10-03T23:44:09.060" v="793" actId="20577"/>
+        <pc:chgData name="Yoshiharu Hamaguchi" userId="470e288704938fe9" providerId="LiveId" clId="{F8197544-B22B-4A13-B6C3-E7FBEF954393}" dt="2024-10-04T00:05:01.692" v="1367" actId="13926"/>
         <pc:sldMkLst>
           <pc:docMk/>
           <pc:sldMk cId="3485624740" sldId="265"/>
         </pc:sldMkLst>
         <pc:spChg chg="mod">
-          <ac:chgData name="Yoshiharu Hamaguchi" userId="470e288704938fe9" providerId="LiveId" clId="{F8197544-B22B-4A13-B6C3-E7FBEF954393}" dt="2024-10-03T23:43:26.170" v="721" actId="20577"/>
+          <ac:chgData name="Yoshiharu Hamaguchi" userId="470e288704938fe9" providerId="LiveId" clId="{F8197544-B22B-4A13-B6C3-E7FBEF954393}" dt="2024-10-04T00:03:21.929" v="1285" actId="255"/>
           <ac:spMkLst>
             <pc:docMk/>
             <pc:sldMk cId="3485624740" sldId="265"/>
@@ -278,7 +287,7 @@
           </ac:spMkLst>
         </pc:spChg>
         <pc:spChg chg="mod">
-          <ac:chgData name="Yoshiharu Hamaguchi" userId="470e288704938fe9" providerId="LiveId" clId="{F8197544-B22B-4A13-B6C3-E7FBEF954393}" dt="2024-10-03T23:44:09.060" v="793" actId="20577"/>
+          <ac:chgData name="Yoshiharu Hamaguchi" userId="470e288704938fe9" providerId="LiveId" clId="{F8197544-B22B-4A13-B6C3-E7FBEF954393}" dt="2024-10-04T00:05:01.692" v="1367" actId="13926"/>
           <ac:spMkLst>
             <pc:docMk/>
             <pc:sldMk cId="3485624740" sldId="265"/>
@@ -286,13 +295,75 @@
           </ac:spMkLst>
         </pc:spChg>
         <pc:spChg chg="add mod">
-          <ac:chgData name="Yoshiharu Hamaguchi" userId="470e288704938fe9" providerId="LiveId" clId="{F8197544-B22B-4A13-B6C3-E7FBEF954393}" dt="2024-10-03T23:43:10.443" v="684"/>
+          <ac:chgData name="Yoshiharu Hamaguchi" userId="470e288704938fe9" providerId="LiveId" clId="{F8197544-B22B-4A13-B6C3-E7FBEF954393}" dt="2024-10-04T00:02:40.987" v="1262" actId="207"/>
           <ac:spMkLst>
             <pc:docMk/>
             <pc:sldMk cId="3485624740" sldId="265"/>
             <ac:spMk id="4" creationId="{5E16C75D-79A5-53EC-442E-2E7232CBEAD2}"/>
           </ac:spMkLst>
         </pc:spChg>
+      </pc:sldChg>
+      <pc:sldChg chg="modSp add del mod">
+        <pc:chgData name="Yoshiharu Hamaguchi" userId="470e288704938fe9" providerId="LiveId" clId="{F8197544-B22B-4A13-B6C3-E7FBEF954393}" dt="2024-10-04T00:02:18.687" v="1260" actId="2696"/>
+        <pc:sldMkLst>
+          <pc:docMk/>
+          <pc:sldMk cId="2646311320" sldId="266"/>
+        </pc:sldMkLst>
+        <pc:spChg chg="mod">
+          <ac:chgData name="Yoshiharu Hamaguchi" userId="470e288704938fe9" providerId="LiveId" clId="{F8197544-B22B-4A13-B6C3-E7FBEF954393}" dt="2024-10-03T23:57:52.549" v="973" actId="20577"/>
+          <ac:spMkLst>
+            <pc:docMk/>
+            <pc:sldMk cId="2646311320" sldId="266"/>
+            <ac:spMk id="3" creationId="{37025C41-8921-578C-16F8-6B5CF0A93AE0}"/>
+          </ac:spMkLst>
+        </pc:spChg>
+      </pc:sldChg>
+      <pc:sldChg chg="addSp delSp modSp add mod">
+        <pc:chgData name="Yoshiharu Hamaguchi" userId="470e288704938fe9" providerId="LiveId" clId="{F8197544-B22B-4A13-B6C3-E7FBEF954393}" dt="2024-10-04T00:06:22.714" v="1400" actId="20577"/>
+        <pc:sldMkLst>
+          <pc:docMk/>
+          <pc:sldMk cId="3214612738" sldId="266"/>
+        </pc:sldMkLst>
+        <pc:spChg chg="mod">
+          <ac:chgData name="Yoshiharu Hamaguchi" userId="470e288704938fe9" providerId="LiveId" clId="{F8197544-B22B-4A13-B6C3-E7FBEF954393}" dt="2024-10-04T00:06:22.714" v="1400" actId="20577"/>
+          <ac:spMkLst>
+            <pc:docMk/>
+            <pc:sldMk cId="3214612738" sldId="266"/>
+            <ac:spMk id="2" creationId="{9C784ACA-9376-15C6-DD93-68B5D582FADA}"/>
+          </ac:spMkLst>
+        </pc:spChg>
+        <pc:spChg chg="mod">
+          <ac:chgData name="Yoshiharu Hamaguchi" userId="470e288704938fe9" providerId="LiveId" clId="{F8197544-B22B-4A13-B6C3-E7FBEF954393}" dt="2024-10-04T00:06:05.363" v="1392" actId="13926"/>
+          <ac:spMkLst>
+            <pc:docMk/>
+            <pc:sldMk cId="3214612738" sldId="266"/>
+            <ac:spMk id="3" creationId="{37025C41-8921-578C-16F8-6B5CF0A93AE0}"/>
+          </ac:spMkLst>
+        </pc:spChg>
+        <pc:spChg chg="del">
+          <ac:chgData name="Yoshiharu Hamaguchi" userId="470e288704938fe9" providerId="LiveId" clId="{F8197544-B22B-4A13-B6C3-E7FBEF954393}" dt="2024-10-04T00:02:47.623" v="1263" actId="478"/>
+          <ac:spMkLst>
+            <pc:docMk/>
+            <pc:sldMk cId="3214612738" sldId="266"/>
+            <ac:spMk id="4" creationId="{5E16C75D-79A5-53EC-442E-2E7232CBEAD2}"/>
+          </ac:spMkLst>
+        </pc:spChg>
+        <pc:spChg chg="add mod">
+          <ac:chgData name="Yoshiharu Hamaguchi" userId="470e288704938fe9" providerId="LiveId" clId="{F8197544-B22B-4A13-B6C3-E7FBEF954393}" dt="2024-10-04T00:02:47.977" v="1264"/>
+          <ac:spMkLst>
+            <pc:docMk/>
+            <pc:sldMk cId="3214612738" sldId="266"/>
+            <ac:spMk id="5" creationId="{FFBC9270-DC0A-4F3E-A829-F8E13D587704}"/>
+          </ac:spMkLst>
+        </pc:spChg>
+        <pc:graphicFrameChg chg="add del modGraphic">
+          <ac:chgData name="Yoshiharu Hamaguchi" userId="470e288704938fe9" providerId="LiveId" clId="{F8197544-B22B-4A13-B6C3-E7FBEF954393}" dt="2024-10-04T00:04:41.029" v="1353" actId="27309"/>
+          <ac:graphicFrameMkLst>
+            <pc:docMk/>
+            <pc:sldMk cId="3214612738" sldId="266"/>
+            <ac:graphicFrameMk id="7" creationId="{A4DA9587-ED7B-1053-CE8A-EFC0D9760585}"/>
+          </ac:graphicFrameMkLst>
+        </pc:graphicFrameChg>
       </pc:sldChg>
       <pc:sldChg chg="del">
         <pc:chgData name="Yoshiharu Hamaguchi" userId="470e288704938fe9" providerId="LiveId" clId="{F8197544-B22B-4A13-B6C3-E7FBEF954393}" dt="2024-10-03T23:44:19.502" v="794" actId="2696"/>
@@ -300,6 +371,52 @@
           <pc:docMk/>
           <pc:sldMk cId="768576187" sldId="267"/>
         </pc:sldMkLst>
+      </pc:sldChg>
+      <pc:sldChg chg="modSp add mod">
+        <pc:chgData name="Yoshiharu Hamaguchi" userId="470e288704938fe9" providerId="LiveId" clId="{F8197544-B22B-4A13-B6C3-E7FBEF954393}" dt="2024-10-04T00:07:22.397" v="1411" actId="20577"/>
+        <pc:sldMkLst>
+          <pc:docMk/>
+          <pc:sldMk cId="2388129881" sldId="267"/>
+        </pc:sldMkLst>
+        <pc:spChg chg="mod">
+          <ac:chgData name="Yoshiharu Hamaguchi" userId="470e288704938fe9" providerId="LiveId" clId="{F8197544-B22B-4A13-B6C3-E7FBEF954393}" dt="2024-10-04T00:07:22.397" v="1411" actId="20577"/>
+          <ac:spMkLst>
+            <pc:docMk/>
+            <pc:sldMk cId="2388129881" sldId="267"/>
+            <ac:spMk id="2" creationId="{9C784ACA-9376-15C6-DD93-68B5D582FADA}"/>
+          </ac:spMkLst>
+        </pc:spChg>
+      </pc:sldChg>
+      <pc:sldChg chg="modSp add mod">
+        <pc:chgData name="Yoshiharu Hamaguchi" userId="470e288704938fe9" providerId="LiveId" clId="{F8197544-B22B-4A13-B6C3-E7FBEF954393}" dt="2024-10-04T00:09:54.746" v="1546" actId="20577"/>
+        <pc:sldMkLst>
+          <pc:docMk/>
+          <pc:sldMk cId="3046662596" sldId="268"/>
+        </pc:sldMkLst>
+        <pc:spChg chg="mod">
+          <ac:chgData name="Yoshiharu Hamaguchi" userId="470e288704938fe9" providerId="LiveId" clId="{F8197544-B22B-4A13-B6C3-E7FBEF954393}" dt="2024-10-04T00:09:15.284" v="1457" actId="20577"/>
+          <ac:spMkLst>
+            <pc:docMk/>
+            <pc:sldMk cId="3046662596" sldId="268"/>
+            <ac:spMk id="2" creationId="{9C784ACA-9376-15C6-DD93-68B5D582FADA}"/>
+          </ac:spMkLst>
+        </pc:spChg>
+        <pc:spChg chg="mod">
+          <ac:chgData name="Yoshiharu Hamaguchi" userId="470e288704938fe9" providerId="LiveId" clId="{F8197544-B22B-4A13-B6C3-E7FBEF954393}" dt="2024-10-04T00:09:54.746" v="1546" actId="20577"/>
+          <ac:spMkLst>
+            <pc:docMk/>
+            <pc:sldMk cId="3046662596" sldId="268"/>
+            <ac:spMk id="3" creationId="{37025C41-8921-578C-16F8-6B5CF0A93AE0}"/>
+          </ac:spMkLst>
+        </pc:spChg>
+        <pc:spChg chg="mod">
+          <ac:chgData name="Yoshiharu Hamaguchi" userId="470e288704938fe9" providerId="LiveId" clId="{F8197544-B22B-4A13-B6C3-E7FBEF954393}" dt="2024-10-04T00:08:42.780" v="1413" actId="20577"/>
+          <ac:spMkLst>
+            <pc:docMk/>
+            <pc:sldMk cId="3046662596" sldId="268"/>
+            <ac:spMk id="5" creationId="{FFBC9270-DC0A-4F3E-A829-F8E13D587704}"/>
+          </ac:spMkLst>
+        </pc:spChg>
       </pc:sldChg>
       <pc:sldChg chg="del">
         <pc:chgData name="Yoshiharu Hamaguchi" userId="470e288704938fe9" providerId="LiveId" clId="{F8197544-B22B-4A13-B6C3-E7FBEF954393}" dt="2024-10-03T23:19:50.644" v="71" actId="2696"/>
@@ -5693,52 +5810,6 @@
             <p:ph type="title"/>
           </p:nvPr>
         </p:nvSpPr>
-        <p:spPr>
-          <a:xfrm>
-            <a:off x="838200" y="365125"/>
-            <a:ext cx="6635496" cy="1325563"/>
-          </a:xfrm>
-        </p:spPr>
-        <p:txBody>
-          <a:bodyPr/>
-          <a:lstStyle/>
-          <a:p>
-            <a:r>
-              <a:rPr lang="ja-JP" altLang="en-US" dirty="0"/>
-              <a:t>任意の文字列</a:t>
-            </a:r>
-            <a:r>
-              <a:rPr lang="en-US" altLang="ja-JP" dirty="0"/>
-              <a:t>(.*</a:t>
-            </a:r>
-            <a:r>
-              <a:rPr lang="ja-JP" altLang="en-US" dirty="0"/>
-              <a:t>か</a:t>
-            </a:r>
-            <a:r>
-              <a:rPr lang="en-US" altLang="ja-JP" dirty="0"/>
-              <a:t>.+)</a:t>
-            </a:r>
-            <a:endParaRPr kumimoji="1" lang="ja-JP" altLang="en-US" dirty="0"/>
-          </a:p>
-        </p:txBody>
-      </p:sp>
-      <p:sp>
-        <p:nvSpPr>
-          <p:cNvPr id="3" name="コンテンツ プレースホルダー 2">
-            <a:extLst>
-              <a:ext uri="{FF2B5EF4-FFF2-40B4-BE49-F238E27FC236}">
-                <a16:creationId xmlns:a16="http://schemas.microsoft.com/office/drawing/2014/main" id="{37025C41-8921-578C-16F8-6B5CF0A93AE0}"/>
-              </a:ext>
-            </a:extLst>
-          </p:cNvPr>
-          <p:cNvSpPr>
-            <a:spLocks noGrp="1"/>
-          </p:cNvSpPr>
-          <p:nvPr>
-            <p:ph idx="1"/>
-          </p:nvPr>
-        </p:nvSpPr>
         <p:spPr/>
         <p:txBody>
           <a:bodyPr>
@@ -5746,124 +5817,60 @@
           </a:bodyPr>
           <a:lstStyle/>
           <a:p>
+            <a:r>
+              <a:rPr kumimoji="1" lang="ja-JP" altLang="en-US" sz="3600" dirty="0"/>
+              <a:t>検索</a:t>
+            </a:r>
+          </a:p>
+        </p:txBody>
+      </p:sp>
+      <p:sp>
+        <p:nvSpPr>
+          <p:cNvPr id="3" name="コンテンツ プレースホルダー 2">
+            <a:extLst>
+              <a:ext uri="{FF2B5EF4-FFF2-40B4-BE49-F238E27FC236}">
+                <a16:creationId xmlns:a16="http://schemas.microsoft.com/office/drawing/2014/main" id="{37025C41-8921-578C-16F8-6B5CF0A93AE0}"/>
+              </a:ext>
+            </a:extLst>
+          </p:cNvPr>
+          <p:cNvSpPr>
+            <a:spLocks noGrp="1"/>
+          </p:cNvSpPr>
+          <p:nvPr>
+            <p:ph idx="1"/>
+          </p:nvPr>
+        </p:nvSpPr>
+        <p:spPr/>
+        <p:txBody>
+          <a:bodyPr>
+            <a:normAutofit/>
+          </a:bodyPr>
+          <a:lstStyle/>
+          <a:p>
             <a:pPr marL="0" indent="0">
               <a:buNone/>
             </a:pPr>
             <a:r>
-              <a:rPr lang="ja-JP" altLang="en-US" sz="2800" dirty="0"/>
-              <a:t>例）</a:t>
-            </a:r>
-            <a:endParaRPr lang="en-US" altLang="ja-JP" sz="2800" dirty="0"/>
-          </a:p>
-          <a:p>
-            <a:pPr marL="0" indent="0">
-              <a:buNone/>
-            </a:pPr>
-            <a:r>
-              <a:rPr lang="ja-JP" altLang="en-US" dirty="0"/>
-              <a:t>ログで、</a:t>
-            </a:r>
-            <a:r>
+              <a:rPr kumimoji="1" lang="ja-JP" altLang="en-US" dirty="0"/>
+              <a:t>・</a:t>
+            </a:r>
+            <a:br>
               <a:rPr lang="en-US" altLang="ja-JP" dirty="0"/>
-              <a:t>VAS</a:t>
-            </a:r>
-            <a:r>
-              <a:rPr lang="ja-JP" altLang="en-US" dirty="0"/>
-              <a:t>の</a:t>
-            </a:r>
-            <a:r>
-              <a:rPr lang="en-US" altLang="ja-JP" dirty="0"/>
-              <a:t>”</a:t>
-            </a:r>
-            <a:r>
-              <a:rPr lang="en-US" altLang="ja-JP" dirty="0" err="1"/>
-              <a:t>abcdef</a:t>
-            </a:r>
-            <a:r>
-              <a:rPr lang="en-US" altLang="ja-JP" dirty="0"/>
-              <a:t>”</a:t>
-            </a:r>
-            <a:r>
-              <a:rPr lang="ja-JP" altLang="en-US" dirty="0"/>
-              <a:t>という関数で、</a:t>
-            </a:r>
-            <a:endParaRPr lang="en-US" altLang="ja-JP" dirty="0"/>
-          </a:p>
-          <a:p>
-            <a:pPr marL="0" indent="0">
-              <a:buNone/>
-            </a:pPr>
-            <a:r>
-              <a:rPr lang="en-US" altLang="ja-JP" sz="2800" dirty="0"/>
-              <a:t>VAS </a:t>
-            </a:r>
+            </a:br>
+            <a:endParaRPr kumimoji="1" lang="en-US" altLang="ja-JP" dirty="0"/>
           </a:p>
           <a:p>
             <a:pPr marL="0" indent="0">
               <a:buNone/>
             </a:pPr>
             <a:endParaRPr kumimoji="1" lang="en-US" altLang="ja-JP" dirty="0"/>
-          </a:p>
-        </p:txBody>
-      </p:sp>
-      <p:sp>
-        <p:nvSpPr>
-          <p:cNvPr id="4" name="タイトル 1">
-            <a:extLst>
-              <a:ext uri="{FF2B5EF4-FFF2-40B4-BE49-F238E27FC236}">
-                <a16:creationId xmlns:a16="http://schemas.microsoft.com/office/drawing/2014/main" id="{5E16C75D-79A5-53EC-442E-2E7232CBEAD2}"/>
-              </a:ext>
-            </a:extLst>
-          </p:cNvPr>
-          <p:cNvSpPr txBox="1">
-            <a:spLocks/>
-          </p:cNvSpPr>
-          <p:nvPr/>
-        </p:nvSpPr>
-        <p:spPr>
-          <a:xfrm>
-            <a:off x="7473696" y="365125"/>
-            <a:ext cx="4230624" cy="1325563"/>
-          </a:xfrm>
-          <a:prstGeom prst="rect">
-            <a:avLst/>
-          </a:prstGeom>
-        </p:spPr>
-        <p:txBody>
-          <a:bodyPr vert="horz" lIns="91440" tIns="45720" rIns="91440" bIns="45720" rtlCol="0" anchor="ctr">
-            <a:normAutofit/>
-          </a:bodyPr>
-          <a:lstStyle>
-            <a:lvl1pPr algn="l" defTabSz="914400" rtl="0" eaLnBrk="1" latinLnBrk="0" hangingPunct="1">
-              <a:lnSpc>
-                <a:spcPct val="90000"/>
-              </a:lnSpc>
-              <a:spcBef>
-                <a:spcPct val="0"/>
-              </a:spcBef>
-              <a:buNone/>
-              <a:defRPr kumimoji="1" sz="4400" kern="1200">
-                <a:solidFill>
-                  <a:schemeClr val="tx1"/>
-                </a:solidFill>
-                <a:latin typeface="+mj-lt"/>
-                <a:ea typeface="+mj-ea"/>
-                <a:cs typeface="+mj-cs"/>
-              </a:defRPr>
-            </a:lvl1pPr>
-          </a:lstStyle>
-          <a:p>
-            <a:r>
-              <a:rPr lang="ja-JP" altLang="en-US" sz="3600" dirty="0"/>
-              <a:t>即効性：☆ ☆ ☆</a:t>
-            </a:r>
           </a:p>
         </p:txBody>
       </p:sp>
     </p:spTree>
     <p:extLst>
       <p:ext uri="{BB962C8B-B14F-4D97-AF65-F5344CB8AC3E}">
-        <p14:creationId xmlns:p14="http://schemas.microsoft.com/office/powerpoint/2010/main" val="3485624740"/>
+        <p14:creationId xmlns:p14="http://schemas.microsoft.com/office/powerpoint/2010/main" val="2388129881"/>
       </p:ext>
     </p:extLst>
   </p:cSld>
@@ -5906,168 +5913,353 @@
             <p:ph type="title"/>
           </p:nvPr>
         </p:nvSpPr>
-        <p:spPr/>
-        <p:txBody>
-          <a:bodyPr/>
-          <a:lstStyle/>
-          <a:p>
-            <a:r>
-              <a:rPr kumimoji="1" lang="ja-JP" altLang="en-US" dirty="0"/>
-              <a:t>引用サイト</a:t>
-            </a:r>
-          </a:p>
-        </p:txBody>
-      </p:sp>
-      <p:sp>
-        <p:nvSpPr>
-          <p:cNvPr id="3" name="コンテンツ プレースホルダー 2">
-            <a:extLst>
-              <a:ext uri="{FF2B5EF4-FFF2-40B4-BE49-F238E27FC236}">
-                <a16:creationId xmlns:a16="http://schemas.microsoft.com/office/drawing/2014/main" id="{37025C41-8921-578C-16F8-6B5CF0A93AE0}"/>
-              </a:ext>
-            </a:extLst>
-          </p:cNvPr>
-          <p:cNvSpPr>
-            <a:spLocks noGrp="1"/>
-          </p:cNvSpPr>
-          <p:nvPr>
-            <p:ph idx="1"/>
-          </p:nvPr>
-        </p:nvSpPr>
-        <p:spPr/>
+        <p:spPr>
+          <a:xfrm>
+            <a:off x="838200" y="365125"/>
+            <a:ext cx="6635496" cy="1325563"/>
+          </a:xfrm>
+        </p:spPr>
         <p:txBody>
           <a:bodyPr>
             <a:normAutofit/>
           </a:bodyPr>
           <a:lstStyle/>
           <a:p>
+            <a:r>
+              <a:rPr lang="ja-JP" altLang="en-US" sz="4000" dirty="0"/>
+              <a:t>①任意の文字列：</a:t>
+            </a:r>
+            <a:r>
+              <a:rPr lang="en-US" altLang="ja-JP" sz="4000" dirty="0"/>
+              <a:t>“.*”</a:t>
+            </a:r>
+            <a:r>
+              <a:rPr lang="ja-JP" altLang="en-US" sz="4000" dirty="0"/>
+              <a:t>か</a:t>
+            </a:r>
+            <a:r>
+              <a:rPr lang="en-US" altLang="ja-JP" sz="4000" dirty="0"/>
+              <a:t>”.+</a:t>
+            </a:r>
+            <a:endParaRPr kumimoji="1" lang="ja-JP" altLang="en-US" sz="4000" dirty="0"/>
+          </a:p>
+        </p:txBody>
+      </p:sp>
+      <p:sp>
+        <p:nvSpPr>
+          <p:cNvPr id="3" name="コンテンツ プレースホルダー 2">
+            <a:extLst>
+              <a:ext uri="{FF2B5EF4-FFF2-40B4-BE49-F238E27FC236}">
+                <a16:creationId xmlns:a16="http://schemas.microsoft.com/office/drawing/2014/main" id="{37025C41-8921-578C-16F8-6B5CF0A93AE0}"/>
+              </a:ext>
+            </a:extLst>
+          </p:cNvPr>
+          <p:cNvSpPr>
+            <a:spLocks noGrp="1"/>
+          </p:cNvSpPr>
+          <p:nvPr>
+            <p:ph idx="1"/>
+          </p:nvPr>
+        </p:nvSpPr>
+        <p:spPr/>
+        <p:txBody>
+          <a:bodyPr>
+            <a:normAutofit fontScale="92500" lnSpcReduction="10000"/>
+          </a:bodyPr>
+          <a:lstStyle/>
+          <a:p>
             <a:pPr marL="0" indent="0">
               <a:buNone/>
             </a:pPr>
             <a:r>
-              <a:rPr lang="en-US" altLang="ja-JP" dirty="0">
-                <a:hlinkClick r:id="rId2"/>
+              <a:rPr lang="ja-JP" altLang="en-US" sz="2800" dirty="0"/>
+              <a:t>例）</a:t>
+            </a:r>
+            <a:r>
+              <a:rPr lang="en-US" altLang="ja-JP" dirty="0"/>
+              <a:t>”VR”</a:t>
+            </a:r>
+            <a:r>
+              <a:rPr lang="ja-JP" altLang="en-US" dirty="0"/>
+              <a:t>があり任意の文字列を経て</a:t>
+            </a:r>
+            <a:r>
+              <a:rPr lang="en-US" altLang="ja-JP" dirty="0"/>
+              <a:t>”</a:t>
+            </a:r>
+            <a:r>
+              <a:rPr lang="en-US" altLang="ja-JP" dirty="0" err="1"/>
+              <a:t>dummyFunc</a:t>
+            </a:r>
+            <a:r>
+              <a:rPr lang="en-US" altLang="ja-JP" dirty="0"/>
+              <a:t>”</a:t>
+            </a:r>
+            <a:r>
+              <a:rPr lang="ja-JP" altLang="en-US" dirty="0"/>
+              <a:t>がある行の抽出</a:t>
+            </a:r>
+            <a:endParaRPr lang="en-US" altLang="ja-JP" dirty="0"/>
+          </a:p>
+          <a:p>
+            <a:pPr marL="0" indent="0">
+              <a:buNone/>
+            </a:pPr>
+            <a:r>
+              <a:rPr lang="en-US" altLang="ja-JP" dirty="0"/>
+              <a:t>【</a:t>
+            </a:r>
+            <a:r>
+              <a:rPr lang="ja-JP" altLang="en-US" dirty="0"/>
+              <a:t>正規表現</a:t>
+            </a:r>
+            <a:r>
+              <a:rPr lang="en-US" altLang="ja-JP" dirty="0"/>
+              <a:t>】</a:t>
+            </a:r>
+          </a:p>
+          <a:p>
+            <a:pPr marL="0" indent="0">
+              <a:buNone/>
+            </a:pPr>
+            <a:r>
+              <a:rPr lang="en-US" altLang="ja-JP" dirty="0"/>
+              <a:t>VR.+ </a:t>
+            </a:r>
+            <a:r>
+              <a:rPr lang="en-US" altLang="ja-JP" dirty="0" err="1"/>
+              <a:t>dummyFunc</a:t>
+            </a:r>
+            <a:endParaRPr lang="en-US" altLang="ja-JP" dirty="0"/>
+          </a:p>
+          <a:p>
+            <a:pPr marL="0" indent="0">
+              <a:buNone/>
+            </a:pPr>
+            <a:r>
+              <a:rPr lang="en-US" altLang="ja-JP" dirty="0"/>
+              <a:t>【</a:t>
+            </a:r>
+            <a:r>
+              <a:rPr lang="ja-JP" altLang="en-US" dirty="0"/>
+              <a:t>この正規表現でヒットする箇所</a:t>
+            </a:r>
+            <a:r>
+              <a:rPr lang="en-US" altLang="ja-JP" dirty="0"/>
+              <a:t>】</a:t>
+            </a:r>
+          </a:p>
+          <a:p>
+            <a:pPr marL="0" indent="0">
+              <a:buNone/>
+            </a:pPr>
+            <a:r>
+              <a:rPr lang="en-US" altLang="ja-JP" sz="2400" dirty="0"/>
+              <a:t>2024/10/04 22:45:23.456 1234.567 I </a:t>
+            </a:r>
+            <a:r>
+              <a:rPr lang="en-US" altLang="ja-JP" sz="2400" dirty="0">
+                <a:highlight>
+                  <a:srgbClr val="FFFF00"/>
+                </a:highlight>
               </a:rPr>
-              <a:t>1.</a:t>
-            </a:r>
-            <a:r>
-              <a:rPr lang="ja-JP" altLang="en-US" dirty="0">
-                <a:hlinkClick r:id="rId2"/>
+              <a:t>VR call </a:t>
+            </a:r>
+            <a:r>
+              <a:rPr lang="en-US" altLang="ja-JP" sz="2400" dirty="0" err="1">
+                <a:highlight>
+                  <a:srgbClr val="FFFF00"/>
+                </a:highlight>
               </a:rPr>
-              <a:t> </a:t>
-            </a:r>
-            <a:r>
-              <a:rPr lang="en-US" altLang="ja-JP" dirty="0">
-                <a:hlinkClick r:id="rId2"/>
+              <a:t>dummyFunc</a:t>
+            </a:r>
+            <a:r>
+              <a:rPr lang="en-US" altLang="ja-JP" sz="2400" dirty="0"/>
+              <a:t> a=1</a:t>
+            </a:r>
+            <a:br>
+              <a:rPr lang="en-US" altLang="ja-JP" sz="2400" dirty="0"/>
+            </a:br>
+            <a:r>
+              <a:rPr lang="en-US" altLang="ja-JP" sz="2400" dirty="0"/>
+              <a:t>2024/10/04 22:45:24.456 1234.567 I TTS call </a:t>
+            </a:r>
+            <a:r>
+              <a:rPr lang="en-US" altLang="ja-JP" sz="2400" dirty="0" err="1"/>
+              <a:t>startTTS</a:t>
+            </a:r>
+            <a:r>
+              <a:rPr lang="en-US" altLang="ja-JP" sz="2400" dirty="0"/>
+              <a:t> b=1</a:t>
+            </a:r>
+            <a:br>
+              <a:rPr lang="en-US" altLang="ja-JP" sz="2400" dirty="0"/>
+            </a:br>
+            <a:r>
+              <a:rPr lang="en-US" altLang="ja-JP" sz="2400" dirty="0"/>
+              <a:t>2024/10/04 22:45:25.456 1234.567 I VR call </a:t>
+            </a:r>
+            <a:r>
+              <a:rPr lang="en-US" altLang="ja-JP" sz="2400" dirty="0" err="1"/>
+              <a:t>hogeFunc</a:t>
+            </a:r>
+            <a:r>
+              <a:rPr lang="en-US" altLang="ja-JP" sz="2400" dirty="0"/>
+              <a:t> c=1</a:t>
+            </a:r>
+            <a:br>
+              <a:rPr lang="en-US" altLang="ja-JP" sz="2400" dirty="0"/>
+            </a:br>
+            <a:r>
+              <a:rPr lang="en-US" altLang="ja-JP" sz="2400" dirty="0"/>
+              <a:t>2024/10/04 22:45:26.456 1234.567 I TTS call </a:t>
+            </a:r>
+            <a:r>
+              <a:rPr lang="en-US" altLang="ja-JP" sz="2400" dirty="0" err="1"/>
+              <a:t>stopTTS</a:t>
+            </a:r>
+            <a:r>
+              <a:rPr lang="en-US" altLang="ja-JP" sz="2400" dirty="0"/>
+              <a:t> d=1</a:t>
+            </a:r>
+            <a:br>
+              <a:rPr lang="en-US" altLang="ja-JP" sz="2400" dirty="0"/>
+            </a:br>
+            <a:r>
+              <a:rPr lang="en-US" altLang="ja-JP" sz="2400" dirty="0"/>
+              <a:t>2024/10/04 22:45:27.456 1234.567 I </a:t>
+            </a:r>
+            <a:r>
+              <a:rPr lang="en-US" altLang="ja-JP" sz="2400" dirty="0">
+                <a:highlight>
+                  <a:srgbClr val="FFFF00"/>
+                </a:highlight>
               </a:rPr>
-              <a:t>Raspberry Pi</a:t>
-            </a:r>
-            <a:r>
-              <a:rPr lang="ja-JP" altLang="en-US" dirty="0">
-                <a:hlinkClick r:id="rId2"/>
+              <a:t>VR call </a:t>
+            </a:r>
+            <a:r>
+              <a:rPr lang="en-US" altLang="ja-JP" sz="2400" dirty="0" err="1">
+                <a:highlight>
+                  <a:srgbClr val="FFFF00"/>
+                </a:highlight>
               </a:rPr>
-              <a:t>で</a:t>
-            </a:r>
-            <a:r>
-              <a:rPr lang="en-US" altLang="ja-JP" dirty="0">
-                <a:hlinkClick r:id="rId2"/>
-              </a:rPr>
-              <a:t>Docker</a:t>
-            </a:r>
-            <a:r>
-              <a:rPr lang="ja-JP" altLang="en-US" dirty="0">
-                <a:hlinkClick r:id="rId2"/>
-              </a:rPr>
-              <a:t>をセットアップ </a:t>
-            </a:r>
-            <a:r>
-              <a:rPr lang="en-US" altLang="ja-JP" dirty="0">
-                <a:hlinkClick r:id="rId2"/>
-              </a:rPr>
-              <a:t>(</a:t>
-            </a:r>
-            <a:r>
-              <a:rPr lang="en-US" altLang="ja-JP" dirty="0" err="1">
-                <a:hlinkClick r:id="rId2"/>
-              </a:rPr>
-              <a:t>zenn.dev</a:t>
-            </a:r>
-            <a:r>
-              <a:rPr lang="en-US" altLang="ja-JP" dirty="0">
-                <a:hlinkClick r:id="rId2"/>
-              </a:rPr>
-              <a:t>)</a:t>
-            </a:r>
-            <a:endParaRPr lang="en-US" altLang="ja-JP" dirty="0"/>
+              <a:t>dummyFunc</a:t>
+            </a:r>
+            <a:r>
+              <a:rPr lang="en-US" altLang="ja-JP" sz="2400" dirty="0"/>
+              <a:t> a=2</a:t>
+            </a:r>
           </a:p>
           <a:p>
             <a:pPr marL="0" indent="0">
               <a:buNone/>
             </a:pPr>
-            <a:endParaRPr lang="en-US" altLang="ja-JP" dirty="0"/>
+            <a:r>
+              <a:rPr lang="en-US" altLang="ja-JP" sz="2400" dirty="0"/>
+              <a:t>【</a:t>
+            </a:r>
+            <a:r>
+              <a:rPr lang="ja-JP" altLang="en-US" sz="2400" dirty="0"/>
+              <a:t>補足</a:t>
+            </a:r>
+            <a:r>
+              <a:rPr lang="en-US" altLang="ja-JP" sz="2400" dirty="0"/>
+              <a:t>】</a:t>
+            </a:r>
+            <a:br>
+              <a:rPr lang="en-US" altLang="ja-JP" sz="2400" dirty="0"/>
+            </a:br>
+            <a:r>
+              <a:rPr lang="ja-JP" altLang="en-US" sz="2400" dirty="0"/>
+              <a:t>・</a:t>
+            </a:r>
+            <a:r>
+              <a:rPr lang="en-US" altLang="ja-JP" sz="2400" dirty="0"/>
+              <a:t>.*</a:t>
+            </a:r>
+            <a:r>
+              <a:rPr lang="ja-JP" altLang="en-US" sz="2400" dirty="0"/>
+              <a:t>は、任意の文字</a:t>
+            </a:r>
+            <a:r>
+              <a:rPr lang="en-US" altLang="ja-JP" sz="2400" dirty="0"/>
+              <a:t>(.)</a:t>
+            </a:r>
+            <a:r>
+              <a:rPr lang="ja-JP" altLang="en-US" sz="2400" dirty="0"/>
+              <a:t>が</a:t>
+            </a:r>
+            <a:r>
+              <a:rPr lang="en-US" altLang="ja-JP" sz="2400" dirty="0"/>
+              <a:t>0</a:t>
+            </a:r>
+            <a:r>
+              <a:rPr lang="ja-JP" altLang="en-US" sz="2400" dirty="0"/>
+              <a:t>文字以上</a:t>
+            </a:r>
+            <a:r>
+              <a:rPr lang="en-US" altLang="ja-JP" sz="2400" dirty="0"/>
+              <a:t>(*)</a:t>
+            </a:r>
+            <a:r>
+              <a:rPr lang="ja-JP" altLang="en-US" sz="2400" dirty="0"/>
+              <a:t>、を意味する</a:t>
+            </a:r>
+            <a:endParaRPr lang="en-US" altLang="ja-JP" sz="2400" dirty="0"/>
           </a:p>
           <a:p>
             <a:pPr marL="0" indent="0">
               <a:buNone/>
             </a:pPr>
             <a:r>
-              <a:rPr lang="en-US" altLang="ja-JP" dirty="0">
-                <a:hlinkClick r:id="rId3"/>
-              </a:rPr>
-              <a:t>2.</a:t>
-            </a:r>
-            <a:r>
-              <a:rPr lang="ja-JP" altLang="en-US" dirty="0">
-                <a:hlinkClick r:id="rId3"/>
-              </a:rPr>
-              <a:t> </a:t>
-            </a:r>
-            <a:r>
-              <a:rPr lang="en-US" altLang="ja-JP" dirty="0">
-                <a:hlinkClick r:id="rId3"/>
-              </a:rPr>
-              <a:t>Raspberry Pi</a:t>
-            </a:r>
-            <a:r>
-              <a:rPr lang="ja-JP" altLang="en-US" dirty="0">
-                <a:hlinkClick r:id="rId3"/>
-              </a:rPr>
-              <a:t>（ラズパイ）のローカル環境で</a:t>
-            </a:r>
-            <a:r>
-              <a:rPr lang="en-US" altLang="ja-JP" dirty="0">
-                <a:hlinkClick r:id="rId3"/>
-              </a:rPr>
-              <a:t>LLM</a:t>
-            </a:r>
-            <a:r>
-              <a:rPr lang="ja-JP" altLang="en-US" dirty="0">
-                <a:hlinkClick r:id="rId3"/>
-              </a:rPr>
-              <a:t>を動かす </a:t>
-            </a:r>
-            <a:r>
-              <a:rPr lang="en-US" altLang="ja-JP" dirty="0">
-                <a:hlinkClick r:id="rId3"/>
-              </a:rPr>
-              <a:t>(</a:t>
-            </a:r>
-            <a:r>
-              <a:rPr lang="en-US" altLang="ja-JP" dirty="0" err="1">
-                <a:hlinkClick r:id="rId3"/>
-              </a:rPr>
-              <a:t>zenn.dev</a:t>
-            </a:r>
-            <a:r>
-              <a:rPr lang="en-US" altLang="ja-JP" dirty="0">
-                <a:hlinkClick r:id="rId3"/>
-              </a:rPr>
-              <a:t>)</a:t>
-            </a:r>
-            <a:br>
-              <a:rPr lang="en-US" altLang="ja-JP" dirty="0"/>
-            </a:br>
-            <a:endParaRPr lang="en-US" altLang="ja-JP" dirty="0"/>
+              <a:rPr lang="ja-JP" altLang="en-US" sz="2400" dirty="0"/>
+              <a:t>・</a:t>
+            </a:r>
+            <a:r>
+              <a:rPr lang="en-US" altLang="ja-JP" sz="2400" dirty="0"/>
+              <a:t>.+</a:t>
+            </a:r>
+            <a:r>
+              <a:rPr lang="ja-JP" altLang="en-US" sz="2400" dirty="0"/>
+              <a:t>は、任意の文字</a:t>
+            </a:r>
+            <a:r>
+              <a:rPr lang="en-US" altLang="ja-JP" sz="2400" dirty="0"/>
+              <a:t>(.)</a:t>
+            </a:r>
+            <a:r>
+              <a:rPr lang="ja-JP" altLang="en-US" sz="2400" dirty="0"/>
+              <a:t>が</a:t>
+            </a:r>
+            <a:r>
+              <a:rPr lang="en-US" altLang="ja-JP" sz="2400" dirty="0"/>
+              <a:t>1</a:t>
+            </a:r>
+            <a:r>
+              <a:rPr lang="ja-JP" altLang="en-US" sz="2400" dirty="0"/>
+              <a:t>文字以上</a:t>
+            </a:r>
+            <a:r>
+              <a:rPr lang="en-US" altLang="ja-JP" sz="2400" dirty="0"/>
+              <a:t>(+)</a:t>
+            </a:r>
+            <a:r>
+              <a:rPr lang="ja-JP" altLang="en-US" sz="2400" dirty="0"/>
+              <a:t>、を意味する</a:t>
+            </a:r>
+            <a:endParaRPr lang="en-US" altLang="ja-JP" sz="2400" dirty="0"/>
+          </a:p>
+          <a:p>
+            <a:pPr marL="0" indent="0">
+              <a:buNone/>
+            </a:pPr>
+            <a:endParaRPr lang="en-US" altLang="ja-JP" sz="2400" dirty="0"/>
+          </a:p>
+          <a:p>
+            <a:pPr marL="0" indent="0">
+              <a:buNone/>
+            </a:pPr>
+            <a:endParaRPr lang="en-US" altLang="ja-JP" sz="2800" dirty="0"/>
           </a:p>
           <a:p>
             <a:pPr marL="0" indent="0">
@@ -6075,18 +6267,975 @@
             </a:pPr>
             <a:endParaRPr kumimoji="1" lang="en-US" altLang="ja-JP" dirty="0"/>
           </a:p>
-          <a:p>
-            <a:pPr marL="0" indent="0">
-              <a:buNone/>
-            </a:pPr>
-            <a:endParaRPr kumimoji="1" lang="en-US" altLang="ja-JP" dirty="0"/>
+        </p:txBody>
+      </p:sp>
+      <p:sp>
+        <p:nvSpPr>
+          <p:cNvPr id="4" name="タイトル 1">
+            <a:extLst>
+              <a:ext uri="{FF2B5EF4-FFF2-40B4-BE49-F238E27FC236}">
+                <a16:creationId xmlns:a16="http://schemas.microsoft.com/office/drawing/2014/main" id="{5E16C75D-79A5-53EC-442E-2E7232CBEAD2}"/>
+              </a:ext>
+            </a:extLst>
+          </p:cNvPr>
+          <p:cNvSpPr txBox="1">
+            <a:spLocks/>
+          </p:cNvSpPr>
+          <p:nvPr/>
+        </p:nvSpPr>
+        <p:spPr>
+          <a:xfrm>
+            <a:off x="7473696" y="365125"/>
+            <a:ext cx="4230624" cy="1325563"/>
+          </a:xfrm>
+          <a:prstGeom prst="rect">
+            <a:avLst/>
+          </a:prstGeom>
+        </p:spPr>
+        <p:txBody>
+          <a:bodyPr vert="horz" lIns="91440" tIns="45720" rIns="91440" bIns="45720" rtlCol="0" anchor="ctr">
+            <a:normAutofit/>
+          </a:bodyPr>
+          <a:lstStyle>
+            <a:lvl1pPr algn="l" defTabSz="914400" rtl="0" eaLnBrk="1" latinLnBrk="0" hangingPunct="1">
+              <a:lnSpc>
+                <a:spcPct val="90000"/>
+              </a:lnSpc>
+              <a:spcBef>
+                <a:spcPct val="0"/>
+              </a:spcBef>
+              <a:buNone/>
+              <a:defRPr kumimoji="1" sz="4400" kern="1200">
+                <a:solidFill>
+                  <a:schemeClr val="tx1"/>
+                </a:solidFill>
+                <a:latin typeface="+mj-lt"/>
+                <a:ea typeface="+mj-ea"/>
+                <a:cs typeface="+mj-cs"/>
+              </a:defRPr>
+            </a:lvl1pPr>
+          </a:lstStyle>
+          <a:p>
+            <a:r>
+              <a:rPr lang="ja-JP" altLang="en-US" sz="3600" dirty="0">
+                <a:solidFill>
+                  <a:schemeClr val="accent4"/>
+                </a:solidFill>
+              </a:rPr>
+              <a:t>即効性：☆ ☆ ☆</a:t>
+            </a:r>
           </a:p>
         </p:txBody>
       </p:sp>
     </p:spTree>
     <p:extLst>
       <p:ext uri="{BB962C8B-B14F-4D97-AF65-F5344CB8AC3E}">
-        <p14:creationId xmlns:p14="http://schemas.microsoft.com/office/powerpoint/2010/main" val="3365730422"/>
+        <p14:creationId xmlns:p14="http://schemas.microsoft.com/office/powerpoint/2010/main" val="3485624740"/>
+      </p:ext>
+    </p:extLst>
+  </p:cSld>
+  <p:clrMapOvr>
+    <a:masterClrMapping/>
+  </p:clrMapOvr>
+</p:sld>
+</file>
+
+<file path=ppt/slides/slide6.xml><?xml version="1.0" encoding="utf-8"?>
+<p:sld xmlns:a="http://schemas.openxmlformats.org/drawingml/2006/main" xmlns:r="http://schemas.openxmlformats.org/officeDocument/2006/relationships" xmlns:p="http://schemas.openxmlformats.org/presentationml/2006/main">
+  <p:cSld>
+    <p:spTree>
+      <p:nvGrpSpPr>
+        <p:cNvPr id="1" name=""/>
+        <p:cNvGrpSpPr/>
+        <p:nvPr/>
+      </p:nvGrpSpPr>
+      <p:grpSpPr>
+        <a:xfrm>
+          <a:off x="0" y="0"/>
+          <a:ext cx="0" cy="0"/>
+          <a:chOff x="0" y="0"/>
+          <a:chExt cx="0" cy="0"/>
+        </a:xfrm>
+      </p:grpSpPr>
+      <p:sp>
+        <p:nvSpPr>
+          <p:cNvPr id="2" name="タイトル 1">
+            <a:extLst>
+              <a:ext uri="{FF2B5EF4-FFF2-40B4-BE49-F238E27FC236}">
+                <a16:creationId xmlns:a16="http://schemas.microsoft.com/office/drawing/2014/main" id="{9C784ACA-9376-15C6-DD93-68B5D582FADA}"/>
+              </a:ext>
+            </a:extLst>
+          </p:cNvPr>
+          <p:cNvSpPr>
+            <a:spLocks noGrp="1"/>
+          </p:cNvSpPr>
+          <p:nvPr>
+            <p:ph type="title"/>
+          </p:nvPr>
+        </p:nvSpPr>
+        <p:spPr>
+          <a:xfrm>
+            <a:off x="838200" y="365125"/>
+            <a:ext cx="6635496" cy="1325563"/>
+          </a:xfrm>
+        </p:spPr>
+        <p:txBody>
+          <a:bodyPr>
+            <a:normAutofit/>
+          </a:bodyPr>
+          <a:lstStyle/>
+          <a:p>
+            <a:r>
+              <a:rPr lang="ja-JP" altLang="en-US" sz="4000" dirty="0"/>
+              <a:t>②グループ：</a:t>
+            </a:r>
+            <a:r>
+              <a:rPr lang="en-US" altLang="ja-JP" sz="4000" dirty="0"/>
+              <a:t>(patt1|patt2)</a:t>
+            </a:r>
+            <a:endParaRPr kumimoji="1" lang="ja-JP" altLang="en-US" sz="4000" dirty="0"/>
+          </a:p>
+        </p:txBody>
+      </p:sp>
+      <p:sp>
+        <p:nvSpPr>
+          <p:cNvPr id="3" name="コンテンツ プレースホルダー 2">
+            <a:extLst>
+              <a:ext uri="{FF2B5EF4-FFF2-40B4-BE49-F238E27FC236}">
+                <a16:creationId xmlns:a16="http://schemas.microsoft.com/office/drawing/2014/main" id="{37025C41-8921-578C-16F8-6B5CF0A93AE0}"/>
+              </a:ext>
+            </a:extLst>
+          </p:cNvPr>
+          <p:cNvSpPr>
+            <a:spLocks noGrp="1"/>
+          </p:cNvSpPr>
+          <p:nvPr>
+            <p:ph idx="1"/>
+          </p:nvPr>
+        </p:nvSpPr>
+        <p:spPr/>
+        <p:txBody>
+          <a:bodyPr>
+            <a:normAutofit fontScale="92500" lnSpcReduction="10000"/>
+          </a:bodyPr>
+          <a:lstStyle/>
+          <a:p>
+            <a:pPr marL="0" indent="0">
+              <a:buNone/>
+            </a:pPr>
+            <a:r>
+              <a:rPr lang="ja-JP" altLang="en-US" sz="2800" dirty="0"/>
+              <a:t>例）</a:t>
+            </a:r>
+            <a:r>
+              <a:rPr lang="en-US" altLang="ja-JP" dirty="0"/>
+              <a:t>”TTS”</a:t>
+            </a:r>
+            <a:r>
+              <a:rPr lang="ja-JP" altLang="en-US" dirty="0"/>
+              <a:t> </a:t>
+            </a:r>
+            <a:r>
+              <a:rPr lang="en-US" altLang="ja-JP" dirty="0"/>
+              <a:t>,</a:t>
+            </a:r>
+            <a:r>
+              <a:rPr lang="ja-JP" altLang="en-US" dirty="0"/>
+              <a:t>任意の文字列</a:t>
+            </a:r>
+            <a:r>
+              <a:rPr lang="en-US" altLang="ja-JP" dirty="0"/>
+              <a:t>,”</a:t>
+            </a:r>
+            <a:r>
+              <a:rPr lang="en-US" altLang="ja-JP" dirty="0" err="1"/>
+              <a:t>startTTS</a:t>
+            </a:r>
+            <a:r>
+              <a:rPr lang="en-US" altLang="ja-JP" dirty="0"/>
+              <a:t>”</a:t>
+            </a:r>
+            <a:r>
+              <a:rPr lang="ja-JP" altLang="en-US" dirty="0"/>
+              <a:t>か</a:t>
+            </a:r>
+            <a:r>
+              <a:rPr lang="en-US" altLang="ja-JP" dirty="0"/>
+              <a:t>”</a:t>
+            </a:r>
+            <a:r>
+              <a:rPr lang="en-US" altLang="ja-JP" dirty="0" err="1"/>
+              <a:t>endTTS</a:t>
+            </a:r>
+            <a:r>
+              <a:rPr lang="en-US" altLang="ja-JP" dirty="0"/>
+              <a:t>”</a:t>
+            </a:r>
+          </a:p>
+          <a:p>
+            <a:pPr marL="0" indent="0">
+              <a:buNone/>
+            </a:pPr>
+            <a:r>
+              <a:rPr lang="en-US" altLang="ja-JP" dirty="0"/>
+              <a:t>【</a:t>
+            </a:r>
+            <a:r>
+              <a:rPr lang="ja-JP" altLang="en-US" dirty="0"/>
+              <a:t>正規表現</a:t>
+            </a:r>
+            <a:r>
+              <a:rPr lang="en-US" altLang="ja-JP" dirty="0"/>
+              <a:t>】</a:t>
+            </a:r>
+          </a:p>
+          <a:p>
+            <a:pPr marL="0" indent="0">
+              <a:buNone/>
+            </a:pPr>
+            <a:r>
+              <a:rPr lang="en-US" altLang="ja-JP" dirty="0"/>
+              <a:t>TTS.+(</a:t>
+            </a:r>
+            <a:r>
+              <a:rPr lang="en-US" altLang="ja-JP" dirty="0" err="1"/>
+              <a:t>startTTS|endTTS</a:t>
+            </a:r>
+            <a:r>
+              <a:rPr lang="en-US" altLang="ja-JP" dirty="0"/>
+              <a:t>)</a:t>
+            </a:r>
+          </a:p>
+          <a:p>
+            <a:pPr marL="0" indent="0">
+              <a:buNone/>
+            </a:pPr>
+            <a:r>
+              <a:rPr lang="en-US" altLang="ja-JP" dirty="0"/>
+              <a:t>【</a:t>
+            </a:r>
+            <a:r>
+              <a:rPr lang="ja-JP" altLang="en-US" dirty="0"/>
+              <a:t>この正規表現でヒットする箇所</a:t>
+            </a:r>
+            <a:r>
+              <a:rPr lang="en-US" altLang="ja-JP" dirty="0"/>
+              <a:t>】</a:t>
+            </a:r>
+          </a:p>
+          <a:p>
+            <a:pPr marL="0" indent="0">
+              <a:buNone/>
+            </a:pPr>
+            <a:r>
+              <a:rPr lang="en-US" altLang="ja-JP" sz="2400" dirty="0"/>
+              <a:t>2024/10/04 22:45:23.456 1234.567 I VR call </a:t>
+            </a:r>
+            <a:r>
+              <a:rPr lang="en-US" altLang="ja-JP" sz="2400" dirty="0" err="1"/>
+              <a:t>dummyFunc</a:t>
+            </a:r>
+            <a:r>
+              <a:rPr lang="en-US" altLang="ja-JP" sz="2400" dirty="0"/>
+              <a:t> a=1</a:t>
+            </a:r>
+            <a:br>
+              <a:rPr lang="en-US" altLang="ja-JP" sz="2400" dirty="0"/>
+            </a:br>
+            <a:r>
+              <a:rPr lang="en-US" altLang="ja-JP" sz="2400" dirty="0"/>
+              <a:t>2024/10/04 22:45:24.456 1234.567 I </a:t>
+            </a:r>
+            <a:r>
+              <a:rPr lang="en-US" altLang="ja-JP" sz="2400" dirty="0">
+                <a:highlight>
+                  <a:srgbClr val="FFFF00"/>
+                </a:highlight>
+              </a:rPr>
+              <a:t>TTS call </a:t>
+            </a:r>
+            <a:r>
+              <a:rPr lang="en-US" altLang="ja-JP" sz="2400" dirty="0" err="1">
+                <a:highlight>
+                  <a:srgbClr val="FFFF00"/>
+                </a:highlight>
+              </a:rPr>
+              <a:t>startTTS</a:t>
+            </a:r>
+            <a:r>
+              <a:rPr lang="en-US" altLang="ja-JP" sz="2400" dirty="0"/>
+              <a:t> b=1</a:t>
+            </a:r>
+            <a:br>
+              <a:rPr lang="en-US" altLang="ja-JP" sz="2400" dirty="0"/>
+            </a:br>
+            <a:r>
+              <a:rPr lang="en-US" altLang="ja-JP" sz="2400" dirty="0"/>
+              <a:t>2024/10/04 22:45:25.456 1234.567 I VR call </a:t>
+            </a:r>
+            <a:r>
+              <a:rPr lang="en-US" altLang="ja-JP" sz="2400" dirty="0" err="1"/>
+              <a:t>hogeFunc</a:t>
+            </a:r>
+            <a:r>
+              <a:rPr lang="en-US" altLang="ja-JP" sz="2400" dirty="0"/>
+              <a:t> c=1</a:t>
+            </a:r>
+            <a:br>
+              <a:rPr lang="en-US" altLang="ja-JP" sz="2400" dirty="0"/>
+            </a:br>
+            <a:r>
+              <a:rPr lang="en-US" altLang="ja-JP" sz="2400" dirty="0"/>
+              <a:t>2024/10/04 22:45:26.456 1234.567 I </a:t>
+            </a:r>
+            <a:r>
+              <a:rPr lang="en-US" altLang="ja-JP" sz="2400" dirty="0">
+                <a:highlight>
+                  <a:srgbClr val="FFFF00"/>
+                </a:highlight>
+              </a:rPr>
+              <a:t>TTS call </a:t>
+            </a:r>
+            <a:r>
+              <a:rPr lang="en-US" altLang="ja-JP" sz="2400" dirty="0" err="1">
+                <a:highlight>
+                  <a:srgbClr val="FFFF00"/>
+                </a:highlight>
+              </a:rPr>
+              <a:t>stopTTS</a:t>
+            </a:r>
+            <a:r>
+              <a:rPr lang="en-US" altLang="ja-JP" sz="2400" dirty="0"/>
+              <a:t> d=1</a:t>
+            </a:r>
+            <a:br>
+              <a:rPr lang="en-US" altLang="ja-JP" sz="2400" dirty="0"/>
+            </a:br>
+            <a:r>
+              <a:rPr lang="en-US" altLang="ja-JP" sz="2400" dirty="0"/>
+              <a:t>2024/10/04 22:45:27.456 1234.567 I VR call </a:t>
+            </a:r>
+            <a:r>
+              <a:rPr lang="en-US" altLang="ja-JP" sz="2400" dirty="0" err="1"/>
+              <a:t>dummyFunc</a:t>
+            </a:r>
+            <a:r>
+              <a:rPr lang="en-US" altLang="ja-JP" sz="2400" dirty="0"/>
+              <a:t> a=2</a:t>
+            </a:r>
+          </a:p>
+          <a:p>
+            <a:pPr marL="0" indent="0">
+              <a:buNone/>
+            </a:pPr>
+            <a:r>
+              <a:rPr lang="en-US" altLang="ja-JP" sz="2400" dirty="0"/>
+              <a:t>【</a:t>
+            </a:r>
+            <a:r>
+              <a:rPr lang="ja-JP" altLang="en-US" sz="2400" dirty="0"/>
+              <a:t>補足</a:t>
+            </a:r>
+            <a:r>
+              <a:rPr lang="en-US" altLang="ja-JP" sz="2400" dirty="0"/>
+              <a:t>】</a:t>
+            </a:r>
+            <a:br>
+              <a:rPr lang="en-US" altLang="ja-JP" sz="2400" dirty="0"/>
+            </a:br>
+            <a:r>
+              <a:rPr lang="ja-JP" altLang="en-US" sz="2400" dirty="0"/>
+              <a:t>・</a:t>
+            </a:r>
+            <a:r>
+              <a:rPr lang="en-US" altLang="ja-JP" sz="2400" dirty="0"/>
+              <a:t>.*</a:t>
+            </a:r>
+            <a:r>
+              <a:rPr lang="ja-JP" altLang="en-US" sz="2400" dirty="0"/>
+              <a:t>は、任意の文字</a:t>
+            </a:r>
+            <a:r>
+              <a:rPr lang="en-US" altLang="ja-JP" sz="2400" dirty="0"/>
+              <a:t>(.)</a:t>
+            </a:r>
+            <a:r>
+              <a:rPr lang="ja-JP" altLang="en-US" sz="2400" dirty="0"/>
+              <a:t>が</a:t>
+            </a:r>
+            <a:r>
+              <a:rPr lang="en-US" altLang="ja-JP" sz="2400" dirty="0"/>
+              <a:t>0</a:t>
+            </a:r>
+            <a:r>
+              <a:rPr lang="ja-JP" altLang="en-US" sz="2400" dirty="0"/>
+              <a:t>文字以上</a:t>
+            </a:r>
+            <a:r>
+              <a:rPr lang="en-US" altLang="ja-JP" sz="2400" dirty="0"/>
+              <a:t>(*)</a:t>
+            </a:r>
+            <a:r>
+              <a:rPr lang="ja-JP" altLang="en-US" sz="2400" dirty="0"/>
+              <a:t>、を意味する</a:t>
+            </a:r>
+            <a:endParaRPr lang="en-US" altLang="ja-JP" sz="2400" dirty="0"/>
+          </a:p>
+          <a:p>
+            <a:pPr marL="0" indent="0">
+              <a:buNone/>
+            </a:pPr>
+            <a:r>
+              <a:rPr lang="ja-JP" altLang="en-US" sz="2400" dirty="0"/>
+              <a:t>・</a:t>
+            </a:r>
+            <a:r>
+              <a:rPr lang="en-US" altLang="ja-JP" sz="2400" dirty="0"/>
+              <a:t>.+</a:t>
+            </a:r>
+            <a:r>
+              <a:rPr lang="ja-JP" altLang="en-US" sz="2400" dirty="0"/>
+              <a:t>は、任意の文字</a:t>
+            </a:r>
+            <a:r>
+              <a:rPr lang="en-US" altLang="ja-JP" sz="2400" dirty="0"/>
+              <a:t>(.)</a:t>
+            </a:r>
+            <a:r>
+              <a:rPr lang="ja-JP" altLang="en-US" sz="2400" dirty="0"/>
+              <a:t>が</a:t>
+            </a:r>
+            <a:r>
+              <a:rPr lang="en-US" altLang="ja-JP" sz="2400" dirty="0"/>
+              <a:t>1</a:t>
+            </a:r>
+            <a:r>
+              <a:rPr lang="ja-JP" altLang="en-US" sz="2400" dirty="0"/>
+              <a:t>文字以上</a:t>
+            </a:r>
+            <a:r>
+              <a:rPr lang="en-US" altLang="ja-JP" sz="2400" dirty="0"/>
+              <a:t>(+)</a:t>
+            </a:r>
+            <a:r>
+              <a:rPr lang="ja-JP" altLang="en-US" sz="2400" dirty="0"/>
+              <a:t>、を意味する</a:t>
+            </a:r>
+            <a:endParaRPr lang="en-US" altLang="ja-JP" sz="2400" dirty="0"/>
+          </a:p>
+          <a:p>
+            <a:pPr marL="0" indent="0">
+              <a:buNone/>
+            </a:pPr>
+            <a:endParaRPr lang="en-US" altLang="ja-JP" sz="2400" dirty="0"/>
+          </a:p>
+          <a:p>
+            <a:pPr marL="0" indent="0">
+              <a:buNone/>
+            </a:pPr>
+            <a:endParaRPr lang="en-US" altLang="ja-JP" sz="2800" dirty="0"/>
+          </a:p>
+          <a:p>
+            <a:pPr marL="0" indent="0">
+              <a:buNone/>
+            </a:pPr>
+            <a:endParaRPr kumimoji="1" lang="en-US" altLang="ja-JP" dirty="0"/>
+          </a:p>
+        </p:txBody>
+      </p:sp>
+      <p:sp>
+        <p:nvSpPr>
+          <p:cNvPr id="5" name="タイトル 1">
+            <a:extLst>
+              <a:ext uri="{FF2B5EF4-FFF2-40B4-BE49-F238E27FC236}">
+                <a16:creationId xmlns:a16="http://schemas.microsoft.com/office/drawing/2014/main" id="{FFBC9270-DC0A-4F3E-A829-F8E13D587704}"/>
+              </a:ext>
+            </a:extLst>
+          </p:cNvPr>
+          <p:cNvSpPr txBox="1">
+            <a:spLocks/>
+          </p:cNvSpPr>
+          <p:nvPr/>
+        </p:nvSpPr>
+        <p:spPr>
+          <a:xfrm>
+            <a:off x="7473696" y="365125"/>
+            <a:ext cx="4230624" cy="1325563"/>
+          </a:xfrm>
+          <a:prstGeom prst="rect">
+            <a:avLst/>
+          </a:prstGeom>
+        </p:spPr>
+        <p:txBody>
+          <a:bodyPr vert="horz" lIns="91440" tIns="45720" rIns="91440" bIns="45720" rtlCol="0" anchor="ctr">
+            <a:normAutofit/>
+          </a:bodyPr>
+          <a:lstStyle>
+            <a:lvl1pPr algn="l" defTabSz="914400" rtl="0" eaLnBrk="1" latinLnBrk="0" hangingPunct="1">
+              <a:lnSpc>
+                <a:spcPct val="90000"/>
+              </a:lnSpc>
+              <a:spcBef>
+                <a:spcPct val="0"/>
+              </a:spcBef>
+              <a:buNone/>
+              <a:defRPr kumimoji="1" sz="4400" kern="1200">
+                <a:solidFill>
+                  <a:schemeClr val="tx1"/>
+                </a:solidFill>
+                <a:latin typeface="+mj-lt"/>
+                <a:ea typeface="+mj-ea"/>
+                <a:cs typeface="+mj-cs"/>
+              </a:defRPr>
+            </a:lvl1pPr>
+          </a:lstStyle>
+          <a:p>
+            <a:r>
+              <a:rPr lang="ja-JP" altLang="en-US" sz="3600" dirty="0">
+                <a:solidFill>
+                  <a:schemeClr val="accent4"/>
+                </a:solidFill>
+              </a:rPr>
+              <a:t>即効性：☆ ☆ ☆</a:t>
+            </a:r>
+          </a:p>
+        </p:txBody>
+      </p:sp>
+    </p:spTree>
+    <p:extLst>
+      <p:ext uri="{BB962C8B-B14F-4D97-AF65-F5344CB8AC3E}">
+        <p14:creationId xmlns:p14="http://schemas.microsoft.com/office/powerpoint/2010/main" val="3214612738"/>
+      </p:ext>
+    </p:extLst>
+  </p:cSld>
+  <p:clrMapOvr>
+    <a:masterClrMapping/>
+  </p:clrMapOvr>
+</p:sld>
+</file>
+
+<file path=ppt/slides/slide7.xml><?xml version="1.0" encoding="utf-8"?>
+<p:sld xmlns:a="http://schemas.openxmlformats.org/drawingml/2006/main" xmlns:r="http://schemas.openxmlformats.org/officeDocument/2006/relationships" xmlns:p="http://schemas.openxmlformats.org/presentationml/2006/main">
+  <p:cSld>
+    <p:spTree>
+      <p:nvGrpSpPr>
+        <p:cNvPr id="1" name=""/>
+        <p:cNvGrpSpPr/>
+        <p:nvPr/>
+      </p:nvGrpSpPr>
+      <p:grpSpPr>
+        <a:xfrm>
+          <a:off x="0" y="0"/>
+          <a:ext cx="0" cy="0"/>
+          <a:chOff x="0" y="0"/>
+          <a:chExt cx="0" cy="0"/>
+        </a:xfrm>
+      </p:grpSpPr>
+      <p:sp>
+        <p:nvSpPr>
+          <p:cNvPr id="2" name="タイトル 1">
+            <a:extLst>
+              <a:ext uri="{FF2B5EF4-FFF2-40B4-BE49-F238E27FC236}">
+                <a16:creationId xmlns:a16="http://schemas.microsoft.com/office/drawing/2014/main" id="{9C784ACA-9376-15C6-DD93-68B5D582FADA}"/>
+              </a:ext>
+            </a:extLst>
+          </p:cNvPr>
+          <p:cNvSpPr>
+            <a:spLocks noGrp="1"/>
+          </p:cNvSpPr>
+          <p:nvPr>
+            <p:ph type="title"/>
+          </p:nvPr>
+        </p:nvSpPr>
+        <p:spPr>
+          <a:xfrm>
+            <a:off x="838200" y="365125"/>
+            <a:ext cx="6635496" cy="1325563"/>
+          </a:xfrm>
+        </p:spPr>
+        <p:txBody>
+          <a:bodyPr>
+            <a:normAutofit/>
+          </a:bodyPr>
+          <a:lstStyle/>
+          <a:p>
+            <a:r>
+              <a:rPr lang="ja-JP" altLang="en-US" sz="4000" dirty="0"/>
+              <a:t>②空白と非空白：</a:t>
+            </a:r>
+            <a:r>
+              <a:rPr lang="en-US" altLang="ja-JP" sz="4000" dirty="0"/>
+              <a:t>\s , \S</a:t>
+            </a:r>
+            <a:endParaRPr kumimoji="1" lang="ja-JP" altLang="en-US" sz="4000" dirty="0"/>
+          </a:p>
+        </p:txBody>
+      </p:sp>
+      <p:sp>
+        <p:nvSpPr>
+          <p:cNvPr id="3" name="コンテンツ プレースホルダー 2">
+            <a:extLst>
+              <a:ext uri="{FF2B5EF4-FFF2-40B4-BE49-F238E27FC236}">
+                <a16:creationId xmlns:a16="http://schemas.microsoft.com/office/drawing/2014/main" id="{37025C41-8921-578C-16F8-6B5CF0A93AE0}"/>
+              </a:ext>
+            </a:extLst>
+          </p:cNvPr>
+          <p:cNvSpPr>
+            <a:spLocks noGrp="1"/>
+          </p:cNvSpPr>
+          <p:nvPr>
+            <p:ph idx="1"/>
+          </p:nvPr>
+        </p:nvSpPr>
+        <p:spPr/>
+        <p:txBody>
+          <a:bodyPr>
+            <a:normAutofit fontScale="92500" lnSpcReduction="10000"/>
+          </a:bodyPr>
+          <a:lstStyle/>
+          <a:p>
+            <a:pPr marL="0" indent="0">
+              <a:buNone/>
+            </a:pPr>
+            <a:r>
+              <a:rPr lang="ja-JP" altLang="en-US" sz="2800"/>
+              <a:t>例）現在日時の後ろにある時間と</a:t>
+            </a:r>
+            <a:endParaRPr lang="en-US" altLang="ja-JP" dirty="0"/>
+          </a:p>
+          <a:p>
+            <a:pPr marL="0" indent="0">
+              <a:buNone/>
+            </a:pPr>
+            <a:r>
+              <a:rPr lang="en-US" altLang="ja-JP" dirty="0"/>
+              <a:t>【</a:t>
+            </a:r>
+            <a:r>
+              <a:rPr lang="ja-JP" altLang="en-US" dirty="0"/>
+              <a:t>正規表現</a:t>
+            </a:r>
+            <a:r>
+              <a:rPr lang="en-US" altLang="ja-JP" dirty="0"/>
+              <a:t>】</a:t>
+            </a:r>
+          </a:p>
+          <a:p>
+            <a:pPr marL="0" indent="0">
+              <a:buNone/>
+            </a:pPr>
+            <a:r>
+              <a:rPr lang="en-US" altLang="ja-JP" dirty="0"/>
+              <a:t>TTS.+(</a:t>
+            </a:r>
+            <a:r>
+              <a:rPr lang="en-US" altLang="ja-JP" dirty="0" err="1"/>
+              <a:t>startTTS|endTTS</a:t>
+            </a:r>
+            <a:r>
+              <a:rPr lang="en-US" altLang="ja-JP" dirty="0"/>
+              <a:t>)</a:t>
+            </a:r>
+          </a:p>
+          <a:p>
+            <a:pPr marL="0" indent="0">
+              <a:buNone/>
+            </a:pPr>
+            <a:r>
+              <a:rPr lang="en-US" altLang="ja-JP" dirty="0"/>
+              <a:t>【</a:t>
+            </a:r>
+            <a:r>
+              <a:rPr lang="ja-JP" altLang="en-US" dirty="0"/>
+              <a:t>この正規表現でヒットする箇所</a:t>
+            </a:r>
+            <a:r>
+              <a:rPr lang="en-US" altLang="ja-JP" dirty="0"/>
+              <a:t>】</a:t>
+            </a:r>
+          </a:p>
+          <a:p>
+            <a:pPr marL="0" indent="0">
+              <a:buNone/>
+            </a:pPr>
+            <a:r>
+              <a:rPr lang="en-US" altLang="ja-JP" sz="2400" dirty="0"/>
+              <a:t>2024/10/04 22:45:23.456 1234.567 I VR call </a:t>
+            </a:r>
+            <a:r>
+              <a:rPr lang="en-US" altLang="ja-JP" sz="2400" dirty="0" err="1"/>
+              <a:t>dummyFunc</a:t>
+            </a:r>
+            <a:r>
+              <a:rPr lang="en-US" altLang="ja-JP" sz="2400" dirty="0"/>
+              <a:t> a=1</a:t>
+            </a:r>
+            <a:br>
+              <a:rPr lang="en-US" altLang="ja-JP" sz="2400" dirty="0"/>
+            </a:br>
+            <a:r>
+              <a:rPr lang="en-US" altLang="ja-JP" sz="2400" dirty="0"/>
+              <a:t>2024/10/04 22:45:24.456 1234.567 I </a:t>
+            </a:r>
+            <a:r>
+              <a:rPr lang="en-US" altLang="ja-JP" sz="2400" dirty="0">
+                <a:highlight>
+                  <a:srgbClr val="FFFF00"/>
+                </a:highlight>
+              </a:rPr>
+              <a:t>TTS call </a:t>
+            </a:r>
+            <a:r>
+              <a:rPr lang="en-US" altLang="ja-JP" sz="2400" dirty="0" err="1">
+                <a:highlight>
+                  <a:srgbClr val="FFFF00"/>
+                </a:highlight>
+              </a:rPr>
+              <a:t>startTTS</a:t>
+            </a:r>
+            <a:r>
+              <a:rPr lang="en-US" altLang="ja-JP" sz="2400" dirty="0"/>
+              <a:t> b=1</a:t>
+            </a:r>
+            <a:br>
+              <a:rPr lang="en-US" altLang="ja-JP" sz="2400" dirty="0"/>
+            </a:br>
+            <a:r>
+              <a:rPr lang="en-US" altLang="ja-JP" sz="2400" dirty="0"/>
+              <a:t>2024/10/04 22:45:25.456 1234.567 I VR call </a:t>
+            </a:r>
+            <a:r>
+              <a:rPr lang="en-US" altLang="ja-JP" sz="2400" dirty="0" err="1"/>
+              <a:t>hogeFunc</a:t>
+            </a:r>
+            <a:r>
+              <a:rPr lang="en-US" altLang="ja-JP" sz="2400" dirty="0"/>
+              <a:t> c=1</a:t>
+            </a:r>
+            <a:br>
+              <a:rPr lang="en-US" altLang="ja-JP" sz="2400" dirty="0"/>
+            </a:br>
+            <a:r>
+              <a:rPr lang="en-US" altLang="ja-JP" sz="2400" dirty="0"/>
+              <a:t>2024/10/04 22:45:26.456 1234.567 I </a:t>
+            </a:r>
+            <a:r>
+              <a:rPr lang="en-US" altLang="ja-JP" sz="2400" dirty="0">
+                <a:highlight>
+                  <a:srgbClr val="FFFF00"/>
+                </a:highlight>
+              </a:rPr>
+              <a:t>TTS call </a:t>
+            </a:r>
+            <a:r>
+              <a:rPr lang="en-US" altLang="ja-JP" sz="2400" dirty="0" err="1">
+                <a:highlight>
+                  <a:srgbClr val="FFFF00"/>
+                </a:highlight>
+              </a:rPr>
+              <a:t>stopTTS</a:t>
+            </a:r>
+            <a:r>
+              <a:rPr lang="en-US" altLang="ja-JP" sz="2400" dirty="0"/>
+              <a:t> d=1</a:t>
+            </a:r>
+            <a:br>
+              <a:rPr lang="en-US" altLang="ja-JP" sz="2400" dirty="0"/>
+            </a:br>
+            <a:r>
+              <a:rPr lang="en-US" altLang="ja-JP" sz="2400" dirty="0"/>
+              <a:t>2024/10/04 22:45:27.456 1234.567 I VR call </a:t>
+            </a:r>
+            <a:r>
+              <a:rPr lang="en-US" altLang="ja-JP" sz="2400" dirty="0" err="1"/>
+              <a:t>dummyFunc</a:t>
+            </a:r>
+            <a:r>
+              <a:rPr lang="en-US" altLang="ja-JP" sz="2400" dirty="0"/>
+              <a:t> a=2</a:t>
+            </a:r>
+          </a:p>
+          <a:p>
+            <a:pPr marL="0" indent="0">
+              <a:buNone/>
+            </a:pPr>
+            <a:r>
+              <a:rPr lang="en-US" altLang="ja-JP" sz="2400" dirty="0"/>
+              <a:t>【</a:t>
+            </a:r>
+            <a:r>
+              <a:rPr lang="ja-JP" altLang="en-US" sz="2400" dirty="0"/>
+              <a:t>補足</a:t>
+            </a:r>
+            <a:r>
+              <a:rPr lang="en-US" altLang="ja-JP" sz="2400" dirty="0"/>
+              <a:t>】</a:t>
+            </a:r>
+            <a:br>
+              <a:rPr lang="en-US" altLang="ja-JP" sz="2400" dirty="0"/>
+            </a:br>
+            <a:r>
+              <a:rPr lang="ja-JP" altLang="en-US" sz="2400" dirty="0"/>
+              <a:t>・</a:t>
+            </a:r>
+            <a:r>
+              <a:rPr lang="en-US" altLang="ja-JP" sz="2400" dirty="0"/>
+              <a:t>.*</a:t>
+            </a:r>
+            <a:r>
+              <a:rPr lang="ja-JP" altLang="en-US" sz="2400" dirty="0"/>
+              <a:t>は、任意の文字</a:t>
+            </a:r>
+            <a:r>
+              <a:rPr lang="en-US" altLang="ja-JP" sz="2400" dirty="0"/>
+              <a:t>(.)</a:t>
+            </a:r>
+            <a:r>
+              <a:rPr lang="ja-JP" altLang="en-US" sz="2400" dirty="0"/>
+              <a:t>が</a:t>
+            </a:r>
+            <a:r>
+              <a:rPr lang="en-US" altLang="ja-JP" sz="2400" dirty="0"/>
+              <a:t>0</a:t>
+            </a:r>
+            <a:r>
+              <a:rPr lang="ja-JP" altLang="en-US" sz="2400" dirty="0"/>
+              <a:t>文字以上</a:t>
+            </a:r>
+            <a:r>
+              <a:rPr lang="en-US" altLang="ja-JP" sz="2400" dirty="0"/>
+              <a:t>(*)</a:t>
+            </a:r>
+            <a:r>
+              <a:rPr lang="ja-JP" altLang="en-US" sz="2400" dirty="0"/>
+              <a:t>、を意味する</a:t>
+            </a:r>
+            <a:endParaRPr lang="en-US" altLang="ja-JP" sz="2400" dirty="0"/>
+          </a:p>
+          <a:p>
+            <a:pPr marL="0" indent="0">
+              <a:buNone/>
+            </a:pPr>
+            <a:r>
+              <a:rPr lang="ja-JP" altLang="en-US" sz="2400" dirty="0"/>
+              <a:t>・</a:t>
+            </a:r>
+            <a:r>
+              <a:rPr lang="en-US" altLang="ja-JP" sz="2400" dirty="0"/>
+              <a:t>.+</a:t>
+            </a:r>
+            <a:r>
+              <a:rPr lang="ja-JP" altLang="en-US" sz="2400" dirty="0"/>
+              <a:t>は、任意の文字</a:t>
+            </a:r>
+            <a:r>
+              <a:rPr lang="en-US" altLang="ja-JP" sz="2400" dirty="0"/>
+              <a:t>(.)</a:t>
+            </a:r>
+            <a:r>
+              <a:rPr lang="ja-JP" altLang="en-US" sz="2400" dirty="0"/>
+              <a:t>が</a:t>
+            </a:r>
+            <a:r>
+              <a:rPr lang="en-US" altLang="ja-JP" sz="2400" dirty="0"/>
+              <a:t>1</a:t>
+            </a:r>
+            <a:r>
+              <a:rPr lang="ja-JP" altLang="en-US" sz="2400" dirty="0"/>
+              <a:t>文字以上</a:t>
+            </a:r>
+            <a:r>
+              <a:rPr lang="en-US" altLang="ja-JP" sz="2400" dirty="0"/>
+              <a:t>(+)</a:t>
+            </a:r>
+            <a:r>
+              <a:rPr lang="ja-JP" altLang="en-US" sz="2400" dirty="0"/>
+              <a:t>、を意味する</a:t>
+            </a:r>
+            <a:endParaRPr lang="en-US" altLang="ja-JP" sz="2400" dirty="0"/>
+          </a:p>
+          <a:p>
+            <a:pPr marL="0" indent="0">
+              <a:buNone/>
+            </a:pPr>
+            <a:endParaRPr lang="en-US" altLang="ja-JP" sz="2400" dirty="0"/>
+          </a:p>
+          <a:p>
+            <a:pPr marL="0" indent="0">
+              <a:buNone/>
+            </a:pPr>
+            <a:endParaRPr lang="en-US" altLang="ja-JP" sz="2800" dirty="0"/>
+          </a:p>
+          <a:p>
+            <a:pPr marL="0" indent="0">
+              <a:buNone/>
+            </a:pPr>
+            <a:endParaRPr kumimoji="1" lang="en-US" altLang="ja-JP" dirty="0"/>
+          </a:p>
+        </p:txBody>
+      </p:sp>
+      <p:sp>
+        <p:nvSpPr>
+          <p:cNvPr id="5" name="タイトル 1">
+            <a:extLst>
+              <a:ext uri="{FF2B5EF4-FFF2-40B4-BE49-F238E27FC236}">
+                <a16:creationId xmlns:a16="http://schemas.microsoft.com/office/drawing/2014/main" id="{FFBC9270-DC0A-4F3E-A829-F8E13D587704}"/>
+              </a:ext>
+            </a:extLst>
+          </p:cNvPr>
+          <p:cNvSpPr txBox="1">
+            <a:spLocks/>
+          </p:cNvSpPr>
+          <p:nvPr/>
+        </p:nvSpPr>
+        <p:spPr>
+          <a:xfrm>
+            <a:off x="7473696" y="365125"/>
+            <a:ext cx="4230624" cy="1325563"/>
+          </a:xfrm>
+          <a:prstGeom prst="rect">
+            <a:avLst/>
+          </a:prstGeom>
+        </p:spPr>
+        <p:txBody>
+          <a:bodyPr vert="horz" lIns="91440" tIns="45720" rIns="91440" bIns="45720" rtlCol="0" anchor="ctr">
+            <a:normAutofit/>
+          </a:bodyPr>
+          <a:lstStyle>
+            <a:lvl1pPr algn="l" defTabSz="914400" rtl="0" eaLnBrk="1" latinLnBrk="0" hangingPunct="1">
+              <a:lnSpc>
+                <a:spcPct val="90000"/>
+              </a:lnSpc>
+              <a:spcBef>
+                <a:spcPct val="0"/>
+              </a:spcBef>
+              <a:buNone/>
+              <a:defRPr kumimoji="1" sz="4400" kern="1200">
+                <a:solidFill>
+                  <a:schemeClr val="tx1"/>
+                </a:solidFill>
+                <a:latin typeface="+mj-lt"/>
+                <a:ea typeface="+mj-ea"/>
+                <a:cs typeface="+mj-cs"/>
+              </a:defRPr>
+            </a:lvl1pPr>
+          </a:lstStyle>
+          <a:p>
+            <a:r>
+              <a:rPr lang="ja-JP" altLang="en-US" sz="3600" dirty="0">
+                <a:solidFill>
+                  <a:schemeClr val="accent4"/>
+                </a:solidFill>
+              </a:rPr>
+              <a:t>即効性：☆ ☆ </a:t>
+            </a:r>
+          </a:p>
+        </p:txBody>
+      </p:sp>
+    </p:spTree>
+    <p:extLst>
+      <p:ext uri="{BB962C8B-B14F-4D97-AF65-F5344CB8AC3E}">
+        <p14:creationId xmlns:p14="http://schemas.microsoft.com/office/powerpoint/2010/main" val="3046662596"/>
       </p:ext>
     </p:extLst>
   </p:cSld>

</xml_diff>